<commit_message>
uodate UI and conflict merge and fix back-end
</commit_message>
<xml_diff>
--- a/dcomtestcasegeneration/Template/front-end.pptx
+++ b/dcomtestcasegeneration/Template/front-end.pptx
@@ -266,7 +266,7 @@
           <a:p>
             <a:fld id="{AAFD8661-72F5-4610-9C24-B74C2B1C7676}" type="datetimeFigureOut">
               <a:rPr lang="en-US" smtClean="0"/>
-              <a:t>9/21/2021</a:t>
+              <a:t>6/7/2022</a:t>
             </a:fld>
             <a:endParaRPr lang="en-US"/>
           </a:p>
@@ -464,7 +464,7 @@
           <a:p>
             <a:fld id="{AAFD8661-72F5-4610-9C24-B74C2B1C7676}" type="datetimeFigureOut">
               <a:rPr lang="en-US" smtClean="0"/>
-              <a:t>9/21/2021</a:t>
+              <a:t>6/7/2022</a:t>
             </a:fld>
             <a:endParaRPr lang="en-US"/>
           </a:p>
@@ -672,7 +672,7 @@
           <a:p>
             <a:fld id="{AAFD8661-72F5-4610-9C24-B74C2B1C7676}" type="datetimeFigureOut">
               <a:rPr lang="en-US" smtClean="0"/>
-              <a:t>9/21/2021</a:t>
+              <a:t>6/7/2022</a:t>
             </a:fld>
             <a:endParaRPr lang="en-US"/>
           </a:p>
@@ -870,7 +870,7 @@
           <a:p>
             <a:fld id="{AAFD8661-72F5-4610-9C24-B74C2B1C7676}" type="datetimeFigureOut">
               <a:rPr lang="en-US" smtClean="0"/>
-              <a:t>9/21/2021</a:t>
+              <a:t>6/7/2022</a:t>
             </a:fld>
             <a:endParaRPr lang="en-US"/>
           </a:p>
@@ -1145,7 +1145,7 @@
           <a:p>
             <a:fld id="{AAFD8661-72F5-4610-9C24-B74C2B1C7676}" type="datetimeFigureOut">
               <a:rPr lang="en-US" smtClean="0"/>
-              <a:t>9/21/2021</a:t>
+              <a:t>6/7/2022</a:t>
             </a:fld>
             <a:endParaRPr lang="en-US"/>
           </a:p>
@@ -1410,7 +1410,7 @@
           <a:p>
             <a:fld id="{AAFD8661-72F5-4610-9C24-B74C2B1C7676}" type="datetimeFigureOut">
               <a:rPr lang="en-US" smtClean="0"/>
-              <a:t>9/21/2021</a:t>
+              <a:t>6/7/2022</a:t>
             </a:fld>
             <a:endParaRPr lang="en-US"/>
           </a:p>
@@ -1822,7 +1822,7 @@
           <a:p>
             <a:fld id="{AAFD8661-72F5-4610-9C24-B74C2B1C7676}" type="datetimeFigureOut">
               <a:rPr lang="en-US" smtClean="0"/>
-              <a:t>9/21/2021</a:t>
+              <a:t>6/7/2022</a:t>
             </a:fld>
             <a:endParaRPr lang="en-US"/>
           </a:p>
@@ -1963,7 +1963,7 @@
           <a:p>
             <a:fld id="{AAFD8661-72F5-4610-9C24-B74C2B1C7676}" type="datetimeFigureOut">
               <a:rPr lang="en-US" smtClean="0"/>
-              <a:t>9/21/2021</a:t>
+              <a:t>6/7/2022</a:t>
             </a:fld>
             <a:endParaRPr lang="en-US"/>
           </a:p>
@@ -2076,7 +2076,7 @@
           <a:p>
             <a:fld id="{AAFD8661-72F5-4610-9C24-B74C2B1C7676}" type="datetimeFigureOut">
               <a:rPr lang="en-US" smtClean="0"/>
-              <a:t>9/21/2021</a:t>
+              <a:t>6/7/2022</a:t>
             </a:fld>
             <a:endParaRPr lang="en-US"/>
           </a:p>
@@ -2387,7 +2387,7 @@
           <a:p>
             <a:fld id="{AAFD8661-72F5-4610-9C24-B74C2B1C7676}" type="datetimeFigureOut">
               <a:rPr lang="en-US" smtClean="0"/>
-              <a:t>9/21/2021</a:t>
+              <a:t>6/7/2022</a:t>
             </a:fld>
             <a:endParaRPr lang="en-US"/>
           </a:p>
@@ -2675,7 +2675,7 @@
           <a:p>
             <a:fld id="{AAFD8661-72F5-4610-9C24-B74C2B1C7676}" type="datetimeFigureOut">
               <a:rPr lang="en-US" smtClean="0"/>
-              <a:t>9/21/2021</a:t>
+              <a:t>6/7/2022</a:t>
             </a:fld>
             <a:endParaRPr lang="en-US"/>
           </a:p>
@@ -2916,7 +2916,7 @@
           <a:p>
             <a:fld id="{AAFD8661-72F5-4610-9C24-B74C2B1C7676}" type="datetimeFigureOut">
               <a:rPr lang="en-US" smtClean="0"/>
-              <a:t>9/21/2021</a:t>
+              <a:t>6/7/2022</a:t>
             </a:fld>
             <a:endParaRPr lang="en-US"/>
           </a:p>
@@ -4365,7 +4365,7 @@
         </p:nvSpPr>
         <p:spPr>
           <a:xfrm>
-            <a:off x="2746311" y="183501"/>
+            <a:off x="2746311" y="241690"/>
             <a:ext cx="1828800" cy="1828800"/>
           </a:xfrm>
           <a:prstGeom prst="ellipse">
@@ -4707,7 +4707,7 @@
         <p:spPr>
           <a:xfrm>
             <a:off x="2046590" y="3070307"/>
-            <a:ext cx="1750685" cy="1323439"/>
+            <a:ext cx="1750685" cy="1569660"/>
           </a:xfrm>
           <a:prstGeom prst="rect">
             <a:avLst/>
@@ -4722,15 +4722,27 @@
           <a:p>
             <a:pPr algn="ctr"/>
             <a:r>
-              <a:rPr lang="en-US" sz="8000" b="1">
+              <a:rPr lang="en-US" sz="4800" b="1">
                 <a:solidFill>
                   <a:schemeClr val="bg1"/>
                 </a:solidFill>
                 <a:latin typeface="Arial Rounded MT Bold" panose="020F0704030504030204" pitchFamily="34" charset="0"/>
               </a:rPr>
-              <a:t>85</a:t>
-            </a:r>
-            <a:endParaRPr lang="en-US" sz="7200" b="1">
+              <a:t>CAN</a:t>
+            </a:r>
+          </a:p>
+          <a:p>
+            <a:pPr algn="ctr"/>
+            <a:r>
+              <a:rPr lang="en-US" sz="4800" b="1">
+                <a:solidFill>
+                  <a:schemeClr val="bg1"/>
+                </a:solidFill>
+                <a:latin typeface="Arial Rounded MT Bold" panose="020F0704030504030204" pitchFamily="34" charset="0"/>
+              </a:rPr>
+              <a:t>TP</a:t>
+            </a:r>
+            <a:endParaRPr lang="en-US" sz="4400" b="1">
               <a:solidFill>
                 <a:schemeClr val="bg1"/>
               </a:solidFill>

</xml_diff>